<commit_message>
minor anat proc fixes
</commit_message>
<xml_diff>
--- a/workflow.pptx
+++ b/workflow.pptx
@@ -288,7 +288,7 @@
           <a:p>
             <a:fld id="{E9FEAEC8-B7DF-AB4D-A829-E058579EA91B}" type="datetimeFigureOut">
               <a:rPr lang="en-US" smtClean="0"/>
-              <a:t>2/20/17</a:t>
+              <a:t>2/25/17</a:t>
             </a:fld>
             <a:endParaRPr lang="en-US"/>
           </a:p>
@@ -458,7 +458,7 @@
           <a:p>
             <a:fld id="{E9FEAEC8-B7DF-AB4D-A829-E058579EA91B}" type="datetimeFigureOut">
               <a:rPr lang="en-US" smtClean="0"/>
-              <a:t>2/20/17</a:t>
+              <a:t>2/25/17</a:t>
             </a:fld>
             <a:endParaRPr lang="en-US"/>
           </a:p>
@@ -638,7 +638,7 @@
           <a:p>
             <a:fld id="{E9FEAEC8-B7DF-AB4D-A829-E058579EA91B}" type="datetimeFigureOut">
               <a:rPr lang="en-US" smtClean="0"/>
-              <a:t>2/20/17</a:t>
+              <a:t>2/25/17</a:t>
             </a:fld>
             <a:endParaRPr lang="en-US"/>
           </a:p>
@@ -808,7 +808,7 @@
           <a:p>
             <a:fld id="{E9FEAEC8-B7DF-AB4D-A829-E058579EA91B}" type="datetimeFigureOut">
               <a:rPr lang="en-US" smtClean="0"/>
-              <a:t>2/20/17</a:t>
+              <a:t>2/25/17</a:t>
             </a:fld>
             <a:endParaRPr lang="en-US"/>
           </a:p>
@@ -1054,7 +1054,7 @@
           <a:p>
             <a:fld id="{E9FEAEC8-B7DF-AB4D-A829-E058579EA91B}" type="datetimeFigureOut">
               <a:rPr lang="en-US" smtClean="0"/>
-              <a:t>2/20/17</a:t>
+              <a:t>2/25/17</a:t>
             </a:fld>
             <a:endParaRPr lang="en-US"/>
           </a:p>
@@ -1342,7 +1342,7 @@
           <a:p>
             <a:fld id="{E9FEAEC8-B7DF-AB4D-A829-E058579EA91B}" type="datetimeFigureOut">
               <a:rPr lang="en-US" smtClean="0"/>
-              <a:t>2/20/17</a:t>
+              <a:t>2/25/17</a:t>
             </a:fld>
             <a:endParaRPr lang="en-US"/>
           </a:p>
@@ -1769,7 +1769,7 @@
           <a:p>
             <a:fld id="{E9FEAEC8-B7DF-AB4D-A829-E058579EA91B}" type="datetimeFigureOut">
               <a:rPr lang="en-US" smtClean="0"/>
-              <a:t>2/20/17</a:t>
+              <a:t>2/25/17</a:t>
             </a:fld>
             <a:endParaRPr lang="en-US"/>
           </a:p>
@@ -1887,7 +1887,7 @@
           <a:p>
             <a:fld id="{E9FEAEC8-B7DF-AB4D-A829-E058579EA91B}" type="datetimeFigureOut">
               <a:rPr lang="en-US" smtClean="0"/>
-              <a:t>2/20/17</a:t>
+              <a:t>2/25/17</a:t>
             </a:fld>
             <a:endParaRPr lang="en-US"/>
           </a:p>
@@ -1982,7 +1982,7 @@
           <a:p>
             <a:fld id="{E9FEAEC8-B7DF-AB4D-A829-E058579EA91B}" type="datetimeFigureOut">
               <a:rPr lang="en-US" smtClean="0"/>
-              <a:t>2/20/17</a:t>
+              <a:t>2/25/17</a:t>
             </a:fld>
             <a:endParaRPr lang="en-US"/>
           </a:p>
@@ -2259,7 +2259,7 @@
           <a:p>
             <a:fld id="{E9FEAEC8-B7DF-AB4D-A829-E058579EA91B}" type="datetimeFigureOut">
               <a:rPr lang="en-US" smtClean="0"/>
-              <a:t>2/20/17</a:t>
+              <a:t>2/25/17</a:t>
             </a:fld>
             <a:endParaRPr lang="en-US"/>
           </a:p>
@@ -2512,7 +2512,7 @@
           <a:p>
             <a:fld id="{E9FEAEC8-B7DF-AB4D-A829-E058579EA91B}" type="datetimeFigureOut">
               <a:rPr lang="en-US" smtClean="0"/>
-              <a:t>2/20/17</a:t>
+              <a:t>2/25/17</a:t>
             </a:fld>
             <a:endParaRPr lang="en-US"/>
           </a:p>
@@ -2725,7 +2725,7 @@
           <a:p>
             <a:fld id="{E9FEAEC8-B7DF-AB4D-A829-E058579EA91B}" type="datetimeFigureOut">
               <a:rPr lang="en-US" smtClean="0"/>
-              <a:t>2/20/17</a:t>
+              <a:t>2/25/17</a:t>
             </a:fld>
             <a:endParaRPr lang="en-US"/>
           </a:p>
@@ -3148,7 +3148,7 @@
         </p:nvSpPr>
         <p:spPr>
           <a:xfrm>
-            <a:off x="373256" y="1021125"/>
+            <a:off x="373256" y="961059"/>
             <a:ext cx="1329984" cy="772279"/>
           </a:xfrm>
           <a:prstGeom prst="roundRect">
@@ -3182,7 +3182,7 @@
             <a:pPr algn="ctr"/>
             <a:r>
               <a:rPr lang="en-US" dirty="0" smtClean="0"/>
-              <a:t>ASL</a:t>
+              <a:t>ASL Scan</a:t>
             </a:r>
             <a:endParaRPr lang="en-US" dirty="0"/>
           </a:p>
@@ -3238,57 +3238,6 @@
       </p:sp>
       <p:sp>
         <p:nvSpPr>
-          <p:cNvPr id="6" name="Rounded Rectangle 5"/>
-          <p:cNvSpPr/>
-          <p:nvPr/>
-        </p:nvSpPr>
-        <p:spPr>
-          <a:xfrm>
-            <a:off x="2436874" y="1021125"/>
-            <a:ext cx="1329984" cy="772279"/>
-          </a:xfrm>
-          <a:prstGeom prst="roundRect">
-            <a:avLst/>
-          </a:prstGeom>
-          <a:solidFill>
-            <a:schemeClr val="bg1">
-              <a:lumMod val="85000"/>
-            </a:schemeClr>
-          </a:solidFill>
-        </p:spPr>
-        <p:style>
-          <a:lnRef idx="2">
-            <a:schemeClr val="dk1"/>
-          </a:lnRef>
-          <a:fillRef idx="1">
-            <a:schemeClr val="lt1"/>
-          </a:fillRef>
-          <a:effectRef idx="0">
-            <a:schemeClr val="dk1"/>
-          </a:effectRef>
-          <a:fontRef idx="minor">
-            <a:schemeClr val="dk1"/>
-          </a:fontRef>
-        </p:style>
-        <p:txBody>
-          <a:bodyPr rtlCol="0" anchor="ctr"/>
-          <a:lstStyle/>
-          <a:p>
-            <a:pPr algn="ctr"/>
-            <a:r>
-              <a:rPr lang="en-US" dirty="0" smtClean="0"/>
-              <a:t>M0 </a:t>
-            </a:r>
-            <a:r>
-              <a:rPr lang="en-US" dirty="0" err="1" smtClean="0"/>
-              <a:t>calc</a:t>
-            </a:r>
-            <a:endParaRPr lang="en-US" dirty="0"/>
-          </a:p>
-        </p:txBody>
-      </p:sp>
-      <p:sp>
-        <p:nvSpPr>
           <p:cNvPr id="7" name="Rounded Rectangle 6"/>
           <p:cNvSpPr/>
           <p:nvPr/>
@@ -3338,51 +3287,6 @@
             <a:r>
               <a:rPr lang="en-US" dirty="0" err="1" smtClean="0"/>
               <a:t>cbf</a:t>
-            </a:r>
-            <a:endParaRPr lang="en-US" dirty="0"/>
-          </a:p>
-        </p:txBody>
-      </p:sp>
-      <p:sp>
-        <p:nvSpPr>
-          <p:cNvPr id="9" name="Rounded Rectangle 8"/>
-          <p:cNvSpPr/>
-          <p:nvPr/>
-        </p:nvSpPr>
-        <p:spPr>
-          <a:xfrm>
-            <a:off x="360384" y="2092037"/>
-            <a:ext cx="1329984" cy="772279"/>
-          </a:xfrm>
-          <a:prstGeom prst="roundRect">
-            <a:avLst/>
-          </a:prstGeom>
-          <a:solidFill>
-            <a:srgbClr val="F2DCDB"/>
-          </a:solidFill>
-        </p:spPr>
-        <p:style>
-          <a:lnRef idx="2">
-            <a:schemeClr val="dk1"/>
-          </a:lnRef>
-          <a:fillRef idx="1">
-            <a:schemeClr val="lt1"/>
-          </a:fillRef>
-          <a:effectRef idx="0">
-            <a:schemeClr val="dk1"/>
-          </a:effectRef>
-          <a:fontRef idx="minor">
-            <a:schemeClr val="dk1"/>
-          </a:fontRef>
-        </p:style>
-        <p:txBody>
-          <a:bodyPr rtlCol="0" anchor="ctr"/>
-          <a:lstStyle/>
-          <a:p>
-            <a:pPr algn="ctr"/>
-            <a:r>
-              <a:rPr lang="en-US" dirty="0" smtClean="0"/>
-              <a:t>slice-timing correction</a:t>
             </a:r>
             <a:endParaRPr lang="en-US" dirty="0"/>
           </a:p>
@@ -3777,14 +3681,14 @@
           <p:cNvPr id="22" name="Straight Arrow Connector 21"/>
           <p:cNvCxnSpPr>
             <a:stCxn id="4" idx="2"/>
-            <a:endCxn id="9" idx="0"/>
+            <a:endCxn id="39" idx="0"/>
           </p:cNvCxnSpPr>
           <p:nvPr/>
         </p:nvCxnSpPr>
         <p:spPr>
           <a:xfrm flipH="1">
-            <a:off x="1025376" y="1793404"/>
-            <a:ext cx="12872" cy="298633"/>
+            <a:off x="1025376" y="1733338"/>
+            <a:ext cx="12872" cy="358699"/>
           </a:xfrm>
           <a:prstGeom prst="straightConnector1">
             <a:avLst/>
@@ -3813,15 +3717,15 @@
         <p:nvCxnSpPr>
           <p:cNvPr id="23" name="Straight Arrow Connector 22"/>
           <p:cNvCxnSpPr>
-            <a:stCxn id="4" idx="3"/>
-            <a:endCxn id="6" idx="1"/>
+            <a:stCxn id="41" idx="2"/>
+            <a:endCxn id="24" idx="0"/>
           </p:cNvCxnSpPr>
           <p:nvPr/>
         </p:nvCxnSpPr>
         <p:spPr>
           <a:xfrm>
-            <a:off x="1703240" y="1407265"/>
-            <a:ext cx="733634" cy="0"/>
+            <a:off x="3101866" y="1733338"/>
+            <a:ext cx="0" cy="358699"/>
           </a:xfrm>
           <a:prstGeom prst="straightConnector1">
             <a:avLst/>
@@ -3902,7 +3806,6 @@
         <p:nvCxnSpPr>
           <p:cNvPr id="28" name="Straight Arrow Connector 27"/>
           <p:cNvCxnSpPr>
-            <a:stCxn id="9" idx="3"/>
             <a:endCxn id="24" idx="1"/>
           </p:cNvCxnSpPr>
           <p:nvPr/>
@@ -3911,43 +3814,6 @@
           <a:xfrm>
             <a:off x="1690368" y="2478177"/>
             <a:ext cx="746506" cy="0"/>
-          </a:xfrm>
-          <a:prstGeom prst="straightConnector1">
-            <a:avLst/>
-          </a:prstGeom>
-          <a:ln>
-            <a:tailEnd type="arrow"/>
-          </a:ln>
-          <a:effectLst/>
-        </p:spPr>
-        <p:style>
-          <a:lnRef idx="2">
-            <a:schemeClr val="dk1"/>
-          </a:lnRef>
-          <a:fillRef idx="0">
-            <a:schemeClr val="dk1"/>
-          </a:fillRef>
-          <a:effectRef idx="1">
-            <a:schemeClr val="dk1"/>
-          </a:effectRef>
-          <a:fontRef idx="minor">
-            <a:schemeClr val="tx1"/>
-          </a:fontRef>
-        </p:style>
-      </p:cxnSp>
-      <p:cxnSp>
-        <p:nvCxnSpPr>
-          <p:cNvPr id="38" name="Straight Arrow Connector 37"/>
-          <p:cNvCxnSpPr>
-            <a:stCxn id="6" idx="2"/>
-            <a:endCxn id="24" idx="0"/>
-          </p:cNvCxnSpPr>
-          <p:nvPr/>
-        </p:nvCxnSpPr>
-        <p:spPr>
-          <a:xfrm>
-            <a:off x="3101866" y="1793404"/>
-            <a:ext cx="0" cy="298633"/>
           </a:xfrm>
           <a:prstGeom prst="straightConnector1">
             <a:avLst/>
@@ -4608,6 +4474,138 @@
           </p:txBody>
         </p:sp>
       </p:grpSp>
+      <p:sp>
+        <p:nvSpPr>
+          <p:cNvPr id="39" name="Rounded Rectangle 38"/>
+          <p:cNvSpPr/>
+          <p:nvPr/>
+        </p:nvSpPr>
+        <p:spPr>
+          <a:xfrm>
+            <a:off x="360384" y="2092037"/>
+            <a:ext cx="1329984" cy="772279"/>
+          </a:xfrm>
+          <a:prstGeom prst="roundRect">
+            <a:avLst/>
+          </a:prstGeom>
+          <a:solidFill>
+            <a:schemeClr val="accent2">
+              <a:lumMod val="20000"/>
+              <a:lumOff val="80000"/>
+            </a:schemeClr>
+          </a:solidFill>
+        </p:spPr>
+        <p:style>
+          <a:lnRef idx="2">
+            <a:schemeClr val="dk1"/>
+          </a:lnRef>
+          <a:fillRef idx="1">
+            <a:schemeClr val="lt1"/>
+          </a:fillRef>
+          <a:effectRef idx="0">
+            <a:schemeClr val="dk1"/>
+          </a:effectRef>
+          <a:fontRef idx="minor">
+            <a:schemeClr val="dk1"/>
+          </a:fontRef>
+        </p:style>
+        <p:txBody>
+          <a:bodyPr rtlCol="0" anchor="ctr"/>
+          <a:lstStyle/>
+          <a:p>
+            <a:pPr algn="ctr"/>
+            <a:r>
+              <a:rPr lang="en-US" dirty="0" smtClean="0"/>
+              <a:t>Bias correction</a:t>
+            </a:r>
+            <a:endParaRPr lang="en-US" dirty="0"/>
+          </a:p>
+        </p:txBody>
+      </p:sp>
+      <p:sp>
+        <p:nvSpPr>
+          <p:cNvPr id="41" name="Rounded Rectangle 40"/>
+          <p:cNvSpPr/>
+          <p:nvPr/>
+        </p:nvSpPr>
+        <p:spPr>
+          <a:xfrm>
+            <a:off x="2436874" y="961059"/>
+            <a:ext cx="1329984" cy="772279"/>
+          </a:xfrm>
+          <a:prstGeom prst="roundRect">
+            <a:avLst/>
+          </a:prstGeom>
+          <a:solidFill>
+            <a:schemeClr val="bg1">
+              <a:lumMod val="85000"/>
+            </a:schemeClr>
+          </a:solidFill>
+        </p:spPr>
+        <p:style>
+          <a:lnRef idx="2">
+            <a:schemeClr val="dk1"/>
+          </a:lnRef>
+          <a:fillRef idx="1">
+            <a:schemeClr val="lt1"/>
+          </a:fillRef>
+          <a:effectRef idx="0">
+            <a:schemeClr val="dk1"/>
+          </a:effectRef>
+          <a:fontRef idx="minor">
+            <a:schemeClr val="dk1"/>
+          </a:fontRef>
+        </p:style>
+        <p:txBody>
+          <a:bodyPr rtlCol="0" anchor="ctr"/>
+          <a:lstStyle/>
+          <a:p>
+            <a:pPr algn="ctr"/>
+            <a:r>
+              <a:rPr lang="en-US" dirty="0" smtClean="0"/>
+              <a:t>Smoothing</a:t>
+            </a:r>
+            <a:endParaRPr lang="en-US" dirty="0"/>
+          </a:p>
+        </p:txBody>
+      </p:sp>
+      <p:cxnSp>
+        <p:nvCxnSpPr>
+          <p:cNvPr id="44" name="Straight Arrow Connector 43"/>
+          <p:cNvCxnSpPr>
+            <a:stCxn id="4" idx="3"/>
+            <a:endCxn id="41" idx="1"/>
+          </p:cNvCxnSpPr>
+          <p:nvPr/>
+        </p:nvCxnSpPr>
+        <p:spPr>
+          <a:xfrm>
+            <a:off x="1703240" y="1347199"/>
+            <a:ext cx="733634" cy="0"/>
+          </a:xfrm>
+          <a:prstGeom prst="straightConnector1">
+            <a:avLst/>
+          </a:prstGeom>
+          <a:ln>
+            <a:tailEnd type="arrow"/>
+          </a:ln>
+          <a:effectLst/>
+        </p:spPr>
+        <p:style>
+          <a:lnRef idx="2">
+            <a:schemeClr val="dk1"/>
+          </a:lnRef>
+          <a:fillRef idx="0">
+            <a:schemeClr val="dk1"/>
+          </a:fillRef>
+          <a:effectRef idx="1">
+            <a:schemeClr val="dk1"/>
+          </a:effectRef>
+          <a:fontRef idx="minor">
+            <a:schemeClr val="tx1"/>
+          </a:fontRef>
+        </p:style>
+      </p:cxnSp>
     </p:spTree>
     <p:extLst>
       <p:ext uri="{BB962C8B-B14F-4D97-AF65-F5344CB8AC3E}">

</xml_diff>